<commit_message>
FCN works with high training acc for CelebA
</commit_message>
<xml_diff>
--- a/Notes/1_Acc_Activation_2x3x6xDNNSize.pptx
+++ b/Notes/1_Acc_Activation_2x3x6xDNNSize.pptx
@@ -110,6 +110,11 @@
       </a:defRPr>
     </a:lvl9pPr>
   </p:defaultTextStyle>
+  <p:extLst>
+    <p:ext uri="{EFAFB233-063F-42B5-8137-9DF3F51BA10A}">
+      <p15:sldGuideLst xmlns:p15="http://schemas.microsoft.com/office/powerpoint/2012/main"/>
+    </p:ext>
+  </p:extLst>
 </p:presentation>
 </file>
 
@@ -260,7 +265,7 @@
           <a:p>
             <a:fld id="{9AB784F6-DDAC-4F14-85D4-227F3B29F2FD}" type="datetimeFigureOut">
               <a:rPr lang="en-US" smtClean="0"/>
-              <a:t>6/5/2023</a:t>
+              <a:t>6/16/2023</a:t>
             </a:fld>
             <a:endParaRPr lang="en-US"/>
           </a:p>
@@ -458,7 +463,7 @@
           <a:p>
             <a:fld id="{9AB784F6-DDAC-4F14-85D4-227F3B29F2FD}" type="datetimeFigureOut">
               <a:rPr lang="en-US" smtClean="0"/>
-              <a:t>6/5/2023</a:t>
+              <a:t>6/16/2023</a:t>
             </a:fld>
             <a:endParaRPr lang="en-US"/>
           </a:p>
@@ -666,7 +671,7 @@
           <a:p>
             <a:fld id="{9AB784F6-DDAC-4F14-85D4-227F3B29F2FD}" type="datetimeFigureOut">
               <a:rPr lang="en-US" smtClean="0"/>
-              <a:t>6/5/2023</a:t>
+              <a:t>6/16/2023</a:t>
             </a:fld>
             <a:endParaRPr lang="en-US"/>
           </a:p>
@@ -864,7 +869,7 @@
           <a:p>
             <a:fld id="{9AB784F6-DDAC-4F14-85D4-227F3B29F2FD}" type="datetimeFigureOut">
               <a:rPr lang="en-US" smtClean="0"/>
-              <a:t>6/5/2023</a:t>
+              <a:t>6/16/2023</a:t>
             </a:fld>
             <a:endParaRPr lang="en-US"/>
           </a:p>
@@ -1139,7 +1144,7 @@
           <a:p>
             <a:fld id="{9AB784F6-DDAC-4F14-85D4-227F3B29F2FD}" type="datetimeFigureOut">
               <a:rPr lang="en-US" smtClean="0"/>
-              <a:t>6/5/2023</a:t>
+              <a:t>6/16/2023</a:t>
             </a:fld>
             <a:endParaRPr lang="en-US"/>
           </a:p>
@@ -1404,7 +1409,7 @@
           <a:p>
             <a:fld id="{9AB784F6-DDAC-4F14-85D4-227F3B29F2FD}" type="datetimeFigureOut">
               <a:rPr lang="en-US" smtClean="0"/>
-              <a:t>6/5/2023</a:t>
+              <a:t>6/16/2023</a:t>
             </a:fld>
             <a:endParaRPr lang="en-US"/>
           </a:p>
@@ -1816,7 +1821,7 @@
           <a:p>
             <a:fld id="{9AB784F6-DDAC-4F14-85D4-227F3B29F2FD}" type="datetimeFigureOut">
               <a:rPr lang="en-US" smtClean="0"/>
-              <a:t>6/5/2023</a:t>
+              <a:t>6/16/2023</a:t>
             </a:fld>
             <a:endParaRPr lang="en-US"/>
           </a:p>
@@ -1957,7 +1962,7 @@
           <a:p>
             <a:fld id="{9AB784F6-DDAC-4F14-85D4-227F3B29F2FD}" type="datetimeFigureOut">
               <a:rPr lang="en-US" smtClean="0"/>
-              <a:t>6/5/2023</a:t>
+              <a:t>6/16/2023</a:t>
             </a:fld>
             <a:endParaRPr lang="en-US"/>
           </a:p>
@@ -2070,7 +2075,7 @@
           <a:p>
             <a:fld id="{9AB784F6-DDAC-4F14-85D4-227F3B29F2FD}" type="datetimeFigureOut">
               <a:rPr lang="en-US" smtClean="0"/>
-              <a:t>6/5/2023</a:t>
+              <a:t>6/16/2023</a:t>
             </a:fld>
             <a:endParaRPr lang="en-US"/>
           </a:p>
@@ -2381,7 +2386,7 @@
           <a:p>
             <a:fld id="{9AB784F6-DDAC-4F14-85D4-227F3B29F2FD}" type="datetimeFigureOut">
               <a:rPr lang="en-US" smtClean="0"/>
-              <a:t>6/5/2023</a:t>
+              <a:t>6/16/2023</a:t>
             </a:fld>
             <a:endParaRPr lang="en-US"/>
           </a:p>
@@ -2669,7 +2674,7 @@
           <a:p>
             <a:fld id="{9AB784F6-DDAC-4F14-85D4-227F3B29F2FD}" type="datetimeFigureOut">
               <a:rPr lang="en-US" smtClean="0"/>
-              <a:t>6/5/2023</a:t>
+              <a:t>6/16/2023</a:t>
             </a:fld>
             <a:endParaRPr lang="en-US"/>
           </a:p>
@@ -2910,7 +2915,7 @@
           <a:p>
             <a:fld id="{9AB784F6-DDAC-4F14-85D4-227F3B29F2FD}" type="datetimeFigureOut">
               <a:rPr lang="en-US" smtClean="0"/>
-              <a:t>6/5/2023</a:t>
+              <a:t>6/16/2023</a:t>
             </a:fld>
             <a:endParaRPr lang="en-US"/>
           </a:p>

</xml_diff>